<commit_message>
sjoerd theory and figure poster
</commit_message>
<xml_diff>
--- a/poster/20180420_Poster.pptx
+++ b/poster/20180420_Poster.pptx
@@ -534,7 +534,7 @@
           <a:p>
             <a:fld id="{CD3F863D-3368-4E2F-8776-57F4344A7882}" type="datetimeFigureOut">
               <a:rPr lang="en-GB" smtClean="0"/>
-              <a:t>20/04/2018</a:t>
+              <a:t>21/04/2018</a:t>
             </a:fld>
             <a:endParaRPr lang="en-GB"/>
           </a:p>
@@ -1365,6 +1365,79 @@
               <a:t>Fifth level</a:t>
             </a:r>
             <a:endParaRPr lang="en-GB"/>
+          </a:p>
+        </p:txBody>
+      </p:sp>
+      <p:sp>
+        <p:nvSpPr>
+          <p:cNvPr id="4" name="Rechthoek 3">
+            <a:extLst>
+              <a:ext uri="{FF2B5EF4-FFF2-40B4-BE49-F238E27FC236}">
+                <a16:creationId xmlns:a16="http://schemas.microsoft.com/office/drawing/2014/main" id="{F0A2DC7D-CC58-4880-ACC8-157A3898918F}"/>
+              </a:ext>
+            </a:extLst>
+          </p:cNvPr>
+          <p:cNvSpPr/>
+          <p:nvPr userDrawn="1"/>
+        </p:nvSpPr>
+        <p:spPr bwMode="auto">
+          <a:xfrm>
+            <a:off x="0" y="4266358"/>
+            <a:ext cx="30279975" cy="4896544"/>
+          </a:xfrm>
+          <a:prstGeom prst="rect">
+            <a:avLst/>
+          </a:prstGeom>
+          <a:blipFill dpi="0" rotWithShape="1">
+            <a:blip r:embed="rId2"/>
+            <a:srcRect/>
+            <a:tile tx="0" ty="0" sx="100000" sy="100000" flip="none" algn="tl"/>
+          </a:blipFill>
+          <a:ln w="12700" cap="flat" cmpd="sng" algn="ctr">
+            <a:noFill/>
+            <a:prstDash val="solid"/>
+            <a:round/>
+            <a:headEnd type="none" w="med" len="med"/>
+            <a:tailEnd type="none" w="med" len="med"/>
+          </a:ln>
+          <a:effectLst/>
+          <a:extLst/>
+        </p:spPr>
+        <p:txBody>
+          <a:bodyPr vert="horz" wrap="none" lIns="91440" tIns="45720" rIns="91440" bIns="45720" numCol="1" rtlCol="0" anchor="t" anchorCtr="0" compatLnSpc="1">
+            <a:prstTxWarp prst="textNoShape">
+              <a:avLst/>
+            </a:prstTxWarp>
+            <a:spAutoFit/>
+          </a:bodyPr>
+          <a:lstStyle/>
+          <a:p>
+            <a:pPr marL="0" marR="0" indent="0" algn="l" defTabSz="914400" rtl="0" eaLnBrk="0" fontAlgn="base" latinLnBrk="0" hangingPunct="0">
+              <a:lnSpc>
+                <a:spcPct val="100000"/>
+              </a:lnSpc>
+              <a:spcBef>
+                <a:spcPct val="0"/>
+              </a:spcBef>
+              <a:spcAft>
+                <a:spcPct val="0"/>
+              </a:spcAft>
+              <a:buClrTx/>
+              <a:buSzTx/>
+              <a:buFontTx/>
+              <a:buNone/>
+              <a:tabLst/>
+            </a:pPr>
+            <a:endParaRPr kumimoji="0" lang="nl-NL" sz="800" b="0" i="0" u="none" strike="noStrike" cap="none" normalizeH="0" baseline="0">
+              <a:ln>
+                <a:noFill/>
+              </a:ln>
+              <a:solidFill>
+                <a:schemeClr val="tx1"/>
+              </a:solidFill>
+              <a:effectLst/>
+              <a:latin typeface="News Gothic" pitchFamily="34" charset="0"/>
+            </a:endParaRPr>
           </a:p>
         </p:txBody>
       </p:sp>
@@ -17392,28 +17465,90 @@
           <a:p>
             <a:pPr algn="ctr"/>
             <a:r>
-              <a:rPr lang="en-US" sz="8700" dirty="0" err="1">
+              <a:rPr lang="en-US" sz="8800" b="1" dirty="0" err="1">
+                <a:ln>
+                  <a:solidFill>
+                    <a:schemeClr val="tx2">
+                      <a:lumMod val="50000"/>
+                    </a:schemeClr>
+                  </a:solidFill>
+                </a:ln>
                 <a:solidFill>
                   <a:srgbClr val="FFFFFF"/>
                 </a:solidFill>
-                <a:latin typeface="News Gothic" pitchFamily="34" charset="0"/>
+                <a:latin typeface="Verdana" panose="020B0604030504040204" pitchFamily="34" charset="0"/>
+                <a:ea typeface="Verdana" panose="020B0604030504040204" pitchFamily="34" charset="0"/>
+                <a:cs typeface="Verdana" panose="020B0604030504040204" pitchFamily="34" charset="0"/>
               </a:rPr>
               <a:t>Drension</a:t>
             </a:r>
             <a:r>
-              <a:rPr lang="en-US" sz="8700" dirty="0">
+              <a:rPr lang="en-US" sz="8800" b="1" dirty="0">
+                <a:ln>
+                  <a:solidFill>
+                    <a:schemeClr val="tx2">
+                      <a:lumMod val="50000"/>
+                    </a:schemeClr>
+                  </a:solidFill>
+                </a:ln>
                 <a:solidFill>
                   <a:srgbClr val="FFFFFF"/>
                 </a:solidFill>
-                <a:latin typeface="News Gothic" pitchFamily="34" charset="0"/>
+                <a:latin typeface="Verdana" panose="020B0604030504040204" pitchFamily="34" charset="0"/>
+                <a:ea typeface="Verdana" panose="020B0604030504040204" pitchFamily="34" charset="0"/>
+                <a:cs typeface="Verdana" panose="020B0604030504040204" pitchFamily="34" charset="0"/>
               </a:rPr>
-              <a:t>: the low-cost, open-source pendant drop tensiometer</a:t>
+              <a:t>: the low-cost, open-source pendant </a:t>
             </a:r>
-            <a:endParaRPr lang="en-AU" sz="8700" dirty="0">
+            <a:br>
+              <a:rPr lang="en-US" sz="8800" b="1" dirty="0">
+                <a:ln>
+                  <a:solidFill>
+                    <a:schemeClr val="tx2">
+                      <a:lumMod val="50000"/>
+                    </a:schemeClr>
+                  </a:solidFill>
+                </a:ln>
+                <a:solidFill>
+                  <a:srgbClr val="FFFFFF"/>
+                </a:solidFill>
+                <a:latin typeface="Verdana" panose="020B0604030504040204" pitchFamily="34" charset="0"/>
+                <a:ea typeface="Verdana" panose="020B0604030504040204" pitchFamily="34" charset="0"/>
+                <a:cs typeface="Verdana" panose="020B0604030504040204" pitchFamily="34" charset="0"/>
+              </a:rPr>
+            </a:br>
+            <a:r>
+              <a:rPr lang="en-US" sz="8800" b="1" dirty="0">
+                <a:ln>
+                  <a:solidFill>
+                    <a:schemeClr val="tx2">
+                      <a:lumMod val="50000"/>
+                    </a:schemeClr>
+                  </a:solidFill>
+                </a:ln>
+                <a:solidFill>
+                  <a:srgbClr val="FFFFFF"/>
+                </a:solidFill>
+                <a:latin typeface="Verdana" panose="020B0604030504040204" pitchFamily="34" charset="0"/>
+                <a:ea typeface="Verdana" panose="020B0604030504040204" pitchFamily="34" charset="0"/>
+                <a:cs typeface="Verdana" panose="020B0604030504040204" pitchFamily="34" charset="0"/>
+              </a:rPr>
+              <a:t>drop tensiometer</a:t>
+            </a:r>
+            <a:endParaRPr lang="en-AU" sz="8800" b="1" dirty="0">
+              <a:ln>
+                <a:solidFill>
+                  <a:schemeClr val="tx2">
+                    <a:lumMod val="50000"/>
+                  </a:schemeClr>
+                </a:solidFill>
+              </a:ln>
               <a:solidFill>
                 <a:srgbClr val="FFFFFF"/>
               </a:solidFill>
-              <a:latin typeface="News Gothic" pitchFamily="34" charset="0"/>
+              <a:latin typeface="Verdana" panose="020B0604030504040204" pitchFamily="34" charset="0"/>
+              <a:ea typeface="Verdana" panose="020B0604030504040204" pitchFamily="34" charset="0"/>
+              <a:cs typeface="Verdana" panose="020B0604030504040204" pitchFamily="34" charset="0"/>
             </a:endParaRPr>
           </a:p>
         </p:txBody>
@@ -20185,6 +20320,21 @@
 </file>
 
 <file path=customXml/item1.xml><?xml version="1.0" encoding="utf-8"?>
+<p:properties xmlns:p="http://schemas.microsoft.com/office/2006/metadata/properties" xmlns:xsi="http://www.w3.org/2001/XMLSchema-instance">
+  <documentManagement/>
+</p:properties>
+</file>
+
+<file path=customXml/item2.xml><?xml version="1.0" encoding="utf-8"?>
+<?mso-contentType ?>
+<FormTemplates xmlns="http://schemas.microsoft.com/sharepoint/v3/contenttype/forms">
+  <Display>DocumentLibraryForm</Display>
+  <Edit>DocumentLibraryForm</Edit>
+  <New>DocumentLibraryForm</New>
+</FormTemplates>
+</file>
+
+<file path=customXml/item3.xml><?xml version="1.0" encoding="utf-8"?>
 <ct:contentTypeSchema xmlns:ct="http://schemas.microsoft.com/office/2006/metadata/contentType" xmlns:ma="http://schemas.microsoft.com/office/2006/metadata/properties/metaAttributes" ct:_="" ma:_="" ma:contentTypeName="Document" ma:contentTypeID="0x0101001A3A7F9150ECC944AD44CEED321B9B85" ma:contentTypeVersion="0" ma:contentTypeDescription="Create a new document." ma:contentTypeScope="" ma:versionID="cbaf3e1e5c511151479434a9ac420b65">
   <xsd:schema xmlns:xsd="http://www.w3.org/2001/XMLSchema" xmlns:xs="http://www.w3.org/2001/XMLSchema" xmlns:p="http://schemas.microsoft.com/office/2006/metadata/properties" targetNamespace="http://schemas.microsoft.com/office/2006/metadata/properties" ma:root="true" ma:fieldsID="c64490b4aec6201516c3a874156f37b2">
     <xsd:element name="properties">
@@ -20298,22 +20448,30 @@
 </ct:contentTypeSchema>
 </file>
 
-<file path=customXml/item2.xml><?xml version="1.0" encoding="utf-8"?>
-<?mso-contentType ?>
-<FormTemplates xmlns="http://schemas.microsoft.com/sharepoint/v3/contenttype/forms">
-  <Display>DocumentLibraryForm</Display>
-  <Edit>DocumentLibraryForm</Edit>
-  <New>DocumentLibraryForm</New>
-</FormTemplates>
+<file path=customXml/itemProps1.xml><?xml version="1.0" encoding="utf-8"?>
+<ds:datastoreItem xmlns:ds="http://schemas.openxmlformats.org/officeDocument/2006/customXml" ds:itemID="{E816EDE9-B266-4FCE-904A-F4D8CEDD273C}">
+  <ds:schemaRefs>
+    <ds:schemaRef ds:uri="http://schemas.microsoft.com/office/2006/documentManagement/types"/>
+    <ds:schemaRef ds:uri="http://purl.org/dc/elements/1.1/"/>
+    <ds:schemaRef ds:uri="http://schemas.openxmlformats.org/package/2006/metadata/core-properties"/>
+    <ds:schemaRef ds:uri="http://purl.org/dc/terms/"/>
+    <ds:schemaRef ds:uri="http://www.w3.org/XML/1998/namespace"/>
+    <ds:schemaRef ds:uri="http://schemas.microsoft.com/office/infopath/2007/PartnerControls"/>
+    <ds:schemaRef ds:uri="http://purl.org/dc/dcmitype/"/>
+    <ds:schemaRef ds:uri="http://schemas.microsoft.com/office/2006/metadata/properties"/>
+  </ds:schemaRefs>
+</ds:datastoreItem>
 </file>
 
-<file path=customXml/item3.xml><?xml version="1.0" encoding="utf-8"?>
-<p:properties xmlns:p="http://schemas.microsoft.com/office/2006/metadata/properties" xmlns:xsi="http://www.w3.org/2001/XMLSchema-instance">
-  <documentManagement/>
-</p:properties>
+<file path=customXml/itemProps2.xml><?xml version="1.0" encoding="utf-8"?>
+<ds:datastoreItem xmlns:ds="http://schemas.openxmlformats.org/officeDocument/2006/customXml" ds:itemID="{5B3FA1A4-4301-4D8D-B4A3-E59B4B015049}">
+  <ds:schemaRefs>
+    <ds:schemaRef ds:uri="http://schemas.microsoft.com/sharepoint/v3/contenttype/forms"/>
+  </ds:schemaRefs>
+</ds:datastoreItem>
 </file>
 
-<file path=customXml/itemProps1.xml><?xml version="1.0" encoding="utf-8"?>
+<file path=customXml/itemProps3.xml><?xml version="1.0" encoding="utf-8"?>
 <ds:datastoreItem xmlns:ds="http://schemas.openxmlformats.org/officeDocument/2006/customXml" ds:itemID="{823248D7-02B6-4829-8C3F-52B7F2249B43}">
   <ds:schemaRefs>
     <ds:schemaRef ds:uri="http://schemas.microsoft.com/office/2006/metadata/contentType"/>
@@ -20327,27 +20485,4 @@
     <ds:schemaRef ds:uri="http://schemas.microsoft.com/office/infopath/2007/PartnerControls"/>
   </ds:schemaRefs>
 </ds:datastoreItem>
-</file>
-
-<file path=customXml/itemProps2.xml><?xml version="1.0" encoding="utf-8"?>
-<ds:datastoreItem xmlns:ds="http://schemas.openxmlformats.org/officeDocument/2006/customXml" ds:itemID="{5B3FA1A4-4301-4D8D-B4A3-E59B4B015049}">
-  <ds:schemaRefs>
-    <ds:schemaRef ds:uri="http://schemas.microsoft.com/sharepoint/v3/contenttype/forms"/>
-  </ds:schemaRefs>
-</ds:datastoreItem>
-</file>
-
-<file path=customXml/itemProps3.xml><?xml version="1.0" encoding="utf-8"?>
-<ds:datastoreItem xmlns:ds="http://schemas.openxmlformats.org/officeDocument/2006/customXml" ds:itemID="{E816EDE9-B266-4FCE-904A-F4D8CEDD273C}">
-  <ds:schemaRefs>
-    <ds:schemaRef ds:uri="http://schemas.microsoft.com/office/2006/documentManagement/types"/>
-    <ds:schemaRef ds:uri="http://purl.org/dc/elements/1.1/"/>
-    <ds:schemaRef ds:uri="http://schemas.openxmlformats.org/package/2006/metadata/core-properties"/>
-    <ds:schemaRef ds:uri="http://purl.org/dc/terms/"/>
-    <ds:schemaRef ds:uri="http://www.w3.org/XML/1998/namespace"/>
-    <ds:schemaRef ds:uri="http://schemas.microsoft.com/office/infopath/2007/PartnerControls"/>
-    <ds:schemaRef ds:uri="http://purl.org/dc/dcmitype/"/>
-    <ds:schemaRef ds:uri="http://schemas.microsoft.com/office/2006/metadata/properties"/>
-  </ds:schemaRefs>
-</ds:datastoreItem>
 </file>
</xml_diff>